<commit_message>
One to grow on..
</commit_message>
<xml_diff>
--- a/Dev/Docs/Starting New Web Projects.pptx
+++ b/Dev/Docs/Starting New Web Projects.pptx
@@ -3707,7 +3707,7 @@
             </a:r>
             <a:r>
               <a:rPr lang="en-US" dirty="0" smtClean="0"/>
-              <a:t> (DATABASE MIGRATIONS!!!)</a:t>
+              <a:t> (Code first + Database migrations!!!)</a:t>
             </a:r>
           </a:p>
           <a:p>
@@ -3867,6 +3867,19 @@
           </a:p>
           <a:p>
             <a:r>
+              <a:rPr lang="en-US" dirty="0" err="1" smtClean="0"/>
+              <a:t>Gravatar</a:t>
+            </a:r>
+            <a:endParaRPr lang="en-US" dirty="0" smtClean="0"/>
+          </a:p>
+          <a:p>
+            <a:r>
+              <a:rPr lang="en-US" smtClean="0"/>
+              <a:t>MiniProfiler</a:t>
+            </a:r>
+          </a:p>
+          <a:p>
+            <a:r>
               <a:rPr lang="en-US" dirty="0" smtClean="0"/>
               <a:t>Glimpse for…</a:t>
             </a:r>
@@ -3899,6 +3912,9 @@
               <a:rPr lang="en-US" dirty="0" err="1" smtClean="0"/>
               <a:t>DotNetOpenAuth</a:t>
             </a:r>
+            <a:endParaRPr lang="en-US" dirty="0"/>
+          </a:p>
+          <a:p>
             <a:endParaRPr lang="en-US" dirty="0" smtClean="0"/>
           </a:p>
         </p:txBody>
@@ -4065,7 +4081,7 @@
           <a:p>
             <a:r>
               <a:rPr lang="en-US" dirty="0" smtClean="0"/>
-              <a:t>Coding</a:t>
+              <a:t>More out of the box	</a:t>
             </a:r>
             <a:endParaRPr lang="en-US" dirty="0"/>
           </a:p>
@@ -4088,8 +4104,10 @@
           <a:p>
             <a:r>
               <a:rPr lang="en-US" dirty="0" smtClean="0"/>
-              <a:t>EF 4.3 code first is awesome! </a:t>
-            </a:r>
+              <a:t>SQL Membership and Role providers</a:t>
+            </a:r>
+          </a:p>
+          <a:p>
             <a:endParaRPr lang="en-US" dirty="0"/>
           </a:p>
         </p:txBody>

</xml_diff>